<commit_message>
update add cover image
</commit_message>
<xml_diff>
--- a/PowerBI_Tutorial.pptx
+++ b/PowerBI_Tutorial.pptx
@@ -10903,56 +10903,108 @@
           <a:chExt cx="0" cy="0"/>
         </a:xfrm>
       </p:grpSpPr>
-      <p:sp>
-        <p:nvSpPr>
-          <p:cNvPr id="2" name="Title 1">
+      <p:pic>
+        <p:nvPicPr>
+          <p:cNvPr id="6" name="Picture 5">
             <a:extLst>
               <a:ext uri="{FF2B5EF4-FFF2-40B4-BE49-F238E27FC236}">
-                <a16:creationId xmlns:a16="http://schemas.microsoft.com/office/drawing/2014/main" id="{47244E19-18D5-C66E-99E8-1860634D8D5C}"/>
+                <a16:creationId xmlns:a16="http://schemas.microsoft.com/office/drawing/2014/main" id="{50CAFD73-E11B-F840-4A9D-3301CE4C505C}"/>
               </a:ext>
             </a:extLst>
           </p:cNvPr>
-          <p:cNvSpPr>
-            <a:spLocks noGrp="1"/>
-          </p:cNvSpPr>
-          <p:nvPr>
-            <p:ph type="title"/>
-          </p:nvPr>
-        </p:nvSpPr>
-        <p:spPr/>
-        <p:txBody>
-          <a:bodyPr/>
-          <a:lstStyle/>
-          <a:p>
-            <a:endParaRPr lang="en-US"/>
-          </a:p>
-        </p:txBody>
-      </p:sp>
-      <p:sp>
-        <p:nvSpPr>
-          <p:cNvPr id="4" name="Text Placeholder 3">
+          <p:cNvPicPr>
+            <a:picLocks noChangeAspect="1"/>
+          </p:cNvPicPr>
+          <p:nvPr/>
+        </p:nvPicPr>
+        <p:blipFill>
+          <a:blip r:embed="rId2"/>
+          <a:stretch>
+            <a:fillRect/>
+          </a:stretch>
+        </p:blipFill>
+        <p:spPr>
+          <a:xfrm>
+            <a:off x="909054" y="1083990"/>
+            <a:ext cx="5874734" cy="5037883"/>
+          </a:xfrm>
+          <a:prstGeom prst="rect">
+            <a:avLst/>
+          </a:prstGeom>
+        </p:spPr>
+      </p:pic>
+      <p:pic>
+        <p:nvPicPr>
+          <p:cNvPr id="9" name="Picture 8">
             <a:extLst>
               <a:ext uri="{FF2B5EF4-FFF2-40B4-BE49-F238E27FC236}">
-                <a16:creationId xmlns:a16="http://schemas.microsoft.com/office/drawing/2014/main" id="{952DCD3A-902A-011D-8004-18BF87CF783A}"/>
+                <a16:creationId xmlns:a16="http://schemas.microsoft.com/office/drawing/2014/main" id="{64D03C02-7C5F-FCD6-ED16-BEA0FE6D88BF}"/>
               </a:ext>
             </a:extLst>
           </p:cNvPr>
-          <p:cNvSpPr>
-            <a:spLocks noGrp="1"/>
-          </p:cNvSpPr>
-          <p:nvPr>
-            <p:ph type="body" sz="quarter" idx="17"/>
-          </p:nvPr>
-        </p:nvSpPr>
-        <p:spPr/>
-        <p:txBody>
-          <a:bodyPr/>
-          <a:lstStyle/>
-          <a:p>
-            <a:endParaRPr lang="en-US"/>
-          </a:p>
-        </p:txBody>
-      </p:sp>
+          <p:cNvPicPr>
+            <a:picLocks noChangeAspect="1"/>
+          </p:cNvPicPr>
+          <p:nvPr/>
+        </p:nvPicPr>
+        <p:blipFill>
+          <a:blip r:embed="rId3"/>
+          <a:stretch>
+            <a:fillRect/>
+          </a:stretch>
+        </p:blipFill>
+        <p:spPr>
+          <a:xfrm>
+            <a:off x="6606172" y="3500232"/>
+            <a:ext cx="4676775" cy="2990850"/>
+          </a:xfrm>
+          <a:prstGeom prst="rect">
+            <a:avLst/>
+          </a:prstGeom>
+          <a:ln>
+            <a:noFill/>
+          </a:ln>
+          <a:effectLst>
+            <a:softEdge rad="112500"/>
+          </a:effectLst>
+        </p:spPr>
+      </p:pic>
+      <p:pic>
+        <p:nvPicPr>
+          <p:cNvPr id="7" name="Picture 6">
+            <a:extLst>
+              <a:ext uri="{FF2B5EF4-FFF2-40B4-BE49-F238E27FC236}">
+                <a16:creationId xmlns:a16="http://schemas.microsoft.com/office/drawing/2014/main" id="{A5950B14-03FB-D0FA-3FF2-604DCE06159E}"/>
+              </a:ext>
+            </a:extLst>
+          </p:cNvPr>
+          <p:cNvPicPr>
+            <a:picLocks noChangeAspect="1"/>
+          </p:cNvPicPr>
+          <p:nvPr/>
+        </p:nvPicPr>
+        <p:blipFill>
+          <a:blip r:embed="rId4"/>
+          <a:stretch>
+            <a:fillRect/>
+          </a:stretch>
+        </p:blipFill>
+        <p:spPr>
+          <a:xfrm>
+            <a:off x="5750502" y="537883"/>
+            <a:ext cx="3334065" cy="3319997"/>
+          </a:xfrm>
+          <a:prstGeom prst="rect">
+            <a:avLst/>
+          </a:prstGeom>
+          <a:ln>
+            <a:noFill/>
+          </a:ln>
+          <a:effectLst>
+            <a:softEdge rad="112500"/>
+          </a:effectLst>
+        </p:spPr>
+      </p:pic>
     </p:spTree>
     <p:extLst>
       <p:ext uri="{BB962C8B-B14F-4D97-AF65-F5344CB8AC3E}">

</xml_diff>

<commit_message>
update and adding sample dataset
</commit_message>
<xml_diff>
--- a/PowerBI_Tutorial.pptx
+++ b/PowerBI_Tutorial.pptx
@@ -5,16 +5,17 @@
     <p:sldMasterId id="2147483696" r:id="rId4"/>
   </p:sldMasterIdLst>
   <p:notesMasterIdLst>
-    <p:notesMasterId r:id="rId9"/>
+    <p:notesMasterId r:id="rId10"/>
   </p:notesMasterIdLst>
   <p:handoutMasterIdLst>
-    <p:handoutMasterId r:id="rId10"/>
+    <p:handoutMasterId r:id="rId11"/>
   </p:handoutMasterIdLst>
   <p:sldIdLst>
     <p:sldId id="334" r:id="rId5"/>
     <p:sldId id="335" r:id="rId6"/>
     <p:sldId id="336" r:id="rId7"/>
     <p:sldId id="337" r:id="rId8"/>
+    <p:sldId id="338" r:id="rId9"/>
   </p:sldIdLst>
   <p:sldSz cx="12192000" cy="6858000"/>
   <p:notesSz cx="6858000" cy="9144000"/>
@@ -126,6 +127,7 @@
         <p14:section name="Udemy Course Covers" id="{D7DED217-FC2A-4C9E-A35B-9204E76CE79F}">
           <p14:sldIdLst>
             <p14:sldId id="337"/>
+            <p14:sldId id="338"/>
           </p14:sldIdLst>
         </p14:section>
       </p14:sectionLst>
@@ -11015,6 +11017,368 @@
   <p:clrMapOvr>
     <a:masterClrMapping/>
   </p:clrMapOvr>
+</p:sld>
+</file>
+
+<file path=ppt/slides/slide5.xml><?xml version="1.0" encoding="utf-8"?>
+<p:sld xmlns:a="http://schemas.openxmlformats.org/drawingml/2006/main" xmlns:r="http://schemas.openxmlformats.org/officeDocument/2006/relationships" xmlns:p="http://schemas.openxmlformats.org/presentationml/2006/main">
+  <p:cSld>
+    <p:spTree>
+      <p:nvGrpSpPr>
+        <p:cNvPr id="1" name=""/>
+        <p:cNvGrpSpPr/>
+        <p:nvPr/>
+      </p:nvGrpSpPr>
+      <p:grpSpPr>
+        <a:xfrm>
+          <a:off x="0" y="0"/>
+          <a:ext cx="0" cy="0"/>
+          <a:chOff x="0" y="0"/>
+          <a:chExt cx="0" cy="0"/>
+        </a:xfrm>
+      </p:grpSpPr>
+      <p:sp>
+        <p:nvSpPr>
+          <p:cNvPr id="2" name="Title 1">
+            <a:extLst>
+              <a:ext uri="{FF2B5EF4-FFF2-40B4-BE49-F238E27FC236}">
+                <a16:creationId xmlns:a16="http://schemas.microsoft.com/office/drawing/2014/main" id="{4E8733A4-47D3-DBFD-C44B-27DD1982D583}"/>
+              </a:ext>
+            </a:extLst>
+          </p:cNvPr>
+          <p:cNvSpPr>
+            <a:spLocks noGrp="1"/>
+          </p:cNvSpPr>
+          <p:nvPr>
+            <p:ph type="title"/>
+          </p:nvPr>
+        </p:nvSpPr>
+        <p:spPr>
+          <a:xfrm>
+            <a:off x="1409827" y="323765"/>
+            <a:ext cx="6772881" cy="793260"/>
+          </a:xfrm>
+        </p:spPr>
+        <p:txBody>
+          <a:bodyPr anchor="ctr"/>
+          <a:lstStyle/>
+          <a:p>
+            <a:pPr algn="l"/>
+            <a:r>
+              <a:rPr lang="en-US" dirty="0"/>
+              <a:t>Power BI Tutorial</a:t>
+            </a:r>
+          </a:p>
+        </p:txBody>
+      </p:sp>
+      <p:sp>
+        <p:nvSpPr>
+          <p:cNvPr id="4" name="Text Placeholder 3">
+            <a:extLst>
+              <a:ext uri="{FF2B5EF4-FFF2-40B4-BE49-F238E27FC236}">
+                <a16:creationId xmlns:a16="http://schemas.microsoft.com/office/drawing/2014/main" id="{6F1CD235-BE86-A03B-9C1C-C4E733A54537}"/>
+              </a:ext>
+            </a:extLst>
+          </p:cNvPr>
+          <p:cNvSpPr>
+            <a:spLocks noGrp="1"/>
+          </p:cNvSpPr>
+          <p:nvPr>
+            <p:ph type="body" sz="quarter" idx="13"/>
+          </p:nvPr>
+        </p:nvSpPr>
+        <p:spPr>
+          <a:xfrm>
+            <a:off x="7467600" y="3127248"/>
+            <a:ext cx="4290390" cy="3017520"/>
+          </a:xfrm>
+        </p:spPr>
+        <p:txBody>
+          <a:bodyPr>
+            <a:normAutofit/>
+          </a:bodyPr>
+          <a:lstStyle/>
+          <a:p>
+            <a:r>
+              <a:rPr lang="en-US" sz="3600" dirty="0"/>
+              <a:t>Part 0 Introduction</a:t>
+            </a:r>
+          </a:p>
+          <a:p>
+            <a:r>
+              <a:rPr lang="en-US" sz="3600" dirty="0"/>
+              <a:t>[Opening]</a:t>
+            </a:r>
+          </a:p>
+        </p:txBody>
+      </p:sp>
+      <p:sp>
+        <p:nvSpPr>
+          <p:cNvPr id="5" name="TextBox 4">
+            <a:extLst>
+              <a:ext uri="{FF2B5EF4-FFF2-40B4-BE49-F238E27FC236}">
+                <a16:creationId xmlns:a16="http://schemas.microsoft.com/office/drawing/2014/main" id="{0319E6F6-6E82-E347-FB35-362C956AAF85}"/>
+              </a:ext>
+            </a:extLst>
+          </p:cNvPr>
+          <p:cNvSpPr txBox="1"/>
+          <p:nvPr/>
+        </p:nvSpPr>
+        <p:spPr>
+          <a:xfrm>
+            <a:off x="9737656" y="212563"/>
+            <a:ext cx="2089033" cy="1015663"/>
+          </a:xfrm>
+          <a:prstGeom prst="rect">
+            <a:avLst/>
+          </a:prstGeom>
+          <a:noFill/>
+        </p:spPr>
+        <p:txBody>
+          <a:bodyPr wrap="none" rtlCol="0" anchor="ctr">
+            <a:spAutoFit/>
+          </a:bodyPr>
+          <a:lstStyle/>
+          <a:p>
+            <a:pPr algn="ctr"/>
+            <a:r>
+              <a:rPr lang="en-US" sz="6000" b="1" dirty="0">
+                <a:ln w="9525">
+                  <a:solidFill>
+                    <a:schemeClr val="bg1"/>
+                  </a:solidFill>
+                  <a:prstDash val="solid"/>
+                </a:ln>
+                <a:solidFill>
+                  <a:schemeClr val="tx2">
+                    <a:lumMod val="50000"/>
+                    <a:lumOff val="50000"/>
+                  </a:schemeClr>
+                </a:solidFill>
+                <a:effectLst>
+                  <a:outerShdw blurRad="12700" dist="38100" dir="2700000" algn="tl" rotWithShape="0">
+                    <a:schemeClr val="bg1">
+                      <a:lumMod val="50000"/>
+                    </a:schemeClr>
+                  </a:outerShdw>
+                </a:effectLst>
+                <a:latin typeface="Goudy Stout" panose="0202090407030B020401" pitchFamily="18" charset="0"/>
+              </a:rPr>
+              <a:t>000</a:t>
+            </a:r>
+          </a:p>
+        </p:txBody>
+      </p:sp>
+      <p:pic>
+        <p:nvPicPr>
+          <p:cNvPr id="7" name="Picture 6">
+            <a:extLst>
+              <a:ext uri="{FF2B5EF4-FFF2-40B4-BE49-F238E27FC236}">
+                <a16:creationId xmlns:a16="http://schemas.microsoft.com/office/drawing/2014/main" id="{2B5A0F99-6E46-A180-1DB2-9C965C17C5D6}"/>
+              </a:ext>
+            </a:extLst>
+          </p:cNvPr>
+          <p:cNvPicPr>
+            <a:picLocks noChangeAspect="1"/>
+          </p:cNvPicPr>
+          <p:nvPr/>
+        </p:nvPicPr>
+        <p:blipFill>
+          <a:blip r:embed="rId2">
+            <a:clrChange>
+              <a:clrFrom>
+                <a:srgbClr val="F5F5DC"/>
+              </a:clrFrom>
+              <a:clrTo>
+                <a:srgbClr val="F5F5DC">
+                  <a:alpha val="0"/>
+                </a:srgbClr>
+              </a:clrTo>
+            </a:clrChange>
+          </a:blip>
+          <a:stretch>
+            <a:fillRect/>
+          </a:stretch>
+        </p:blipFill>
+        <p:spPr>
+          <a:xfrm>
+            <a:off x="946748" y="1163971"/>
+            <a:ext cx="6772881" cy="5663915"/>
+          </a:xfrm>
+          <a:prstGeom prst="rect">
+            <a:avLst/>
+          </a:prstGeom>
+        </p:spPr>
+      </p:pic>
+      <p:pic>
+        <p:nvPicPr>
+          <p:cNvPr id="8" name="Picture 7">
+            <a:extLst>
+              <a:ext uri="{FF2B5EF4-FFF2-40B4-BE49-F238E27FC236}">
+                <a16:creationId xmlns:a16="http://schemas.microsoft.com/office/drawing/2014/main" id="{54C8FB3B-F6EC-73EC-1F2A-D9CBFA2077AE}"/>
+              </a:ext>
+            </a:extLst>
+          </p:cNvPr>
+          <p:cNvPicPr>
+            <a:picLocks noChangeAspect="1"/>
+          </p:cNvPicPr>
+          <p:nvPr/>
+        </p:nvPicPr>
+        <p:blipFill>
+          <a:blip r:embed="rId3"/>
+          <a:stretch>
+            <a:fillRect/>
+          </a:stretch>
+        </p:blipFill>
+        <p:spPr>
+          <a:xfrm>
+            <a:off x="23412" y="30114"/>
+            <a:ext cx="1386414" cy="1380564"/>
+          </a:xfrm>
+          <a:prstGeom prst="rect">
+            <a:avLst/>
+          </a:prstGeom>
+          <a:ln>
+            <a:noFill/>
+          </a:ln>
+          <a:effectLst>
+            <a:softEdge rad="112500"/>
+          </a:effectLst>
+        </p:spPr>
+      </p:pic>
+      <p:pic>
+        <p:nvPicPr>
+          <p:cNvPr id="9" name="Picture 8">
+            <a:extLst>
+              <a:ext uri="{FF2B5EF4-FFF2-40B4-BE49-F238E27FC236}">
+                <a16:creationId xmlns:a16="http://schemas.microsoft.com/office/drawing/2014/main" id="{E4561B3A-8402-1759-F640-AF478F2406C0}"/>
+              </a:ext>
+            </a:extLst>
+          </p:cNvPr>
+          <p:cNvPicPr>
+            <a:picLocks noChangeAspect="1"/>
+          </p:cNvPicPr>
+          <p:nvPr/>
+        </p:nvPicPr>
+        <p:blipFill>
+          <a:blip r:embed="rId4"/>
+          <a:stretch>
+            <a:fillRect/>
+          </a:stretch>
+        </p:blipFill>
+        <p:spPr>
+          <a:xfrm>
+            <a:off x="4888806" y="4459084"/>
+            <a:ext cx="6937883" cy="2186353"/>
+          </a:xfrm>
+          <a:prstGeom prst="rect">
+            <a:avLst/>
+          </a:prstGeom>
+          <a:ln>
+            <a:noFill/>
+          </a:ln>
+          <a:effectLst>
+            <a:outerShdw blurRad="292100" dist="139700" dir="2700000" algn="tl" rotWithShape="0">
+              <a:srgbClr val="333333">
+                <a:alpha val="65000"/>
+              </a:srgbClr>
+            </a:outerShdw>
+          </a:effectLst>
+        </p:spPr>
+      </p:pic>
+    </p:spTree>
+    <p:extLst>
+      <p:ext uri="{BB962C8B-B14F-4D97-AF65-F5344CB8AC3E}">
+        <p14:creationId xmlns:p14="http://schemas.microsoft.com/office/powerpoint/2010/main" val="255067611"/>
+      </p:ext>
+    </p:extLst>
+  </p:cSld>
+  <p:clrMapOvr>
+    <a:masterClrMapping/>
+  </p:clrMapOvr>
+  <p:timing>
+    <p:tnLst>
+      <p:par>
+        <p:cTn id="1" dur="indefinite" restart="never" nodeType="tmRoot">
+          <p:childTnLst>
+            <p:seq concurrent="1" nextAc="seek">
+              <p:cTn id="2" dur="indefinite" nodeType="mainSeq">
+                <p:childTnLst>
+                  <p:par>
+                    <p:cTn id="3" fill="hold">
+                      <p:stCondLst>
+                        <p:cond delay="indefinite"/>
+                      </p:stCondLst>
+                      <p:childTnLst>
+                        <p:par>
+                          <p:cTn id="4" fill="hold">
+                            <p:stCondLst>
+                              <p:cond delay="0"/>
+                            </p:stCondLst>
+                            <p:childTnLst>
+                              <p:par>
+                                <p:cTn id="5" presetID="10" presetClass="entr" presetSubtype="0" fill="hold" nodeType="clickEffect">
+                                  <p:stCondLst>
+                                    <p:cond delay="0"/>
+                                  </p:stCondLst>
+                                  <p:childTnLst>
+                                    <p:set>
+                                      <p:cBhvr>
+                                        <p:cTn id="6" dur="1" fill="hold">
+                                          <p:stCondLst>
+                                            <p:cond delay="0"/>
+                                          </p:stCondLst>
+                                        </p:cTn>
+                                        <p:tgtEl>
+                                          <p:spTgt spid="9"/>
+                                        </p:tgtEl>
+                                        <p:attrNameLst>
+                                          <p:attrName>style.visibility</p:attrName>
+                                        </p:attrNameLst>
+                                      </p:cBhvr>
+                                      <p:to>
+                                        <p:strVal val="visible"/>
+                                      </p:to>
+                                    </p:set>
+                                    <p:animEffect transition="in" filter="fade">
+                                      <p:cBhvr>
+                                        <p:cTn id="7" dur="500"/>
+                                        <p:tgtEl>
+                                          <p:spTgt spid="9"/>
+                                        </p:tgtEl>
+                                      </p:cBhvr>
+                                    </p:animEffect>
+                                  </p:childTnLst>
+                                </p:cTn>
+                              </p:par>
+                            </p:childTnLst>
+                          </p:cTn>
+                        </p:par>
+                      </p:childTnLst>
+                    </p:cTn>
+                  </p:par>
+                </p:childTnLst>
+              </p:cTn>
+              <p:prevCondLst>
+                <p:cond evt="onPrev" delay="0">
+                  <p:tgtEl>
+                    <p:sldTgt/>
+                  </p:tgtEl>
+                </p:cond>
+              </p:prevCondLst>
+              <p:nextCondLst>
+                <p:cond evt="onNext" delay="0">
+                  <p:tgtEl>
+                    <p:sldTgt/>
+                  </p:tgtEl>
+                </p:cond>
+              </p:nextCondLst>
+            </p:seq>
+          </p:childTnLst>
+        </p:cTn>
+      </p:par>
+    </p:tnLst>
+  </p:timing>
 </p:sld>
 </file>
 

</xml_diff>

<commit_message>
update after part 0
</commit_message>
<xml_diff>
--- a/PowerBI_Tutorial.pptx
+++ b/PowerBI_Tutorial.pptx
@@ -11555,47 +11555,6 @@
           <a:chExt cx="0" cy="0"/>
         </a:xfrm>
       </p:grpSpPr>
-      <p:pic>
-        <p:nvPicPr>
-          <p:cNvPr id="14" name="Picture 13">
-            <a:extLst>
-              <a:ext uri="{FF2B5EF4-FFF2-40B4-BE49-F238E27FC236}">
-                <a16:creationId xmlns:a16="http://schemas.microsoft.com/office/drawing/2014/main" id="{B7163987-0866-FC21-AC97-B97A7DFF892E}"/>
-              </a:ext>
-            </a:extLst>
-          </p:cNvPr>
-          <p:cNvPicPr>
-            <a:picLocks noChangeAspect="1"/>
-          </p:cNvPicPr>
-          <p:nvPr/>
-        </p:nvPicPr>
-        <p:blipFill>
-          <a:blip r:embed="rId2">
-            <a:clrChange>
-              <a:clrFrom>
-                <a:srgbClr val="FFFFFF"/>
-              </a:clrFrom>
-              <a:clrTo>
-                <a:srgbClr val="FFFFFF">
-                  <a:alpha val="0"/>
-                </a:srgbClr>
-              </a:clrTo>
-            </a:clrChange>
-          </a:blip>
-          <a:stretch>
-            <a:fillRect/>
-          </a:stretch>
-        </p:blipFill>
-        <p:spPr>
-          <a:xfrm>
-            <a:off x="498310" y="852861"/>
-            <a:ext cx="6937883" cy="5602504"/>
-          </a:xfrm>
-          <a:prstGeom prst="rect">
-            <a:avLst/>
-          </a:prstGeom>
-        </p:spPr>
-      </p:pic>
       <p:sp>
         <p:nvSpPr>
           <p:cNvPr id="2" name="Title 1">
@@ -11648,8 +11607,8 @@
         </p:nvSpPr>
         <p:spPr>
           <a:xfrm>
-            <a:off x="7467600" y="2595506"/>
-            <a:ext cx="4290390" cy="3017520"/>
+            <a:off x="7831068" y="2595506"/>
+            <a:ext cx="3926922" cy="3017520"/>
           </a:xfrm>
         </p:spPr>
         <p:txBody>
@@ -11737,7 +11696,7 @@
           <p:nvPr/>
         </p:nvPicPr>
         <p:blipFill>
-          <a:blip r:embed="rId3"/>
+          <a:blip r:embed="rId2"/>
           <a:stretch>
             <a:fillRect/>
           </a:stretch>
@@ -11792,7 +11751,7 @@
             </a:r>
             <a:r>
               <a:rPr lang="en-US" b="1">
-                <a:hlinkClick r:id="rId4"/>
+                <a:hlinkClick r:id="rId3"/>
               </a:rPr>
               <a:t>https://github.com/yasenstar/PowerBI_Tutorial</a:t>
             </a:r>
@@ -11800,6 +11759,47 @@
           </a:p>
         </p:txBody>
       </p:sp>
+      <p:pic>
+        <p:nvPicPr>
+          <p:cNvPr id="6" name="Picture 5">
+            <a:extLst>
+              <a:ext uri="{FF2B5EF4-FFF2-40B4-BE49-F238E27FC236}">
+                <a16:creationId xmlns:a16="http://schemas.microsoft.com/office/drawing/2014/main" id="{8661A236-B453-6629-068D-F2464F980333}"/>
+              </a:ext>
+            </a:extLst>
+          </p:cNvPr>
+          <p:cNvPicPr>
+            <a:picLocks noChangeAspect="1"/>
+          </p:cNvPicPr>
+          <p:nvPr/>
+        </p:nvPicPr>
+        <p:blipFill>
+          <a:blip r:embed="rId4">
+            <a:clrChange>
+              <a:clrFrom>
+                <a:srgbClr val="F5F5DC"/>
+              </a:clrFrom>
+              <a:clrTo>
+                <a:srgbClr val="F5F5DC">
+                  <a:alpha val="0"/>
+                </a:srgbClr>
+              </a:clrTo>
+            </a:clrChange>
+          </a:blip>
+          <a:stretch>
+            <a:fillRect/>
+          </a:stretch>
+        </p:blipFill>
+        <p:spPr>
+          <a:xfrm>
+            <a:off x="1409826" y="875461"/>
+            <a:ext cx="8842538" cy="5613026"/>
+          </a:xfrm>
+          <a:prstGeom prst="rect">
+            <a:avLst/>
+          </a:prstGeom>
+        </p:spPr>
+      </p:pic>
       <p:pic>
         <p:nvPicPr>
           <p:cNvPr id="13" name="Picture 12">
@@ -11822,7 +11822,7 @@
         </p:blipFill>
         <p:spPr>
           <a:xfrm>
-            <a:off x="595745" y="1982722"/>
+            <a:off x="1329064" y="2073576"/>
             <a:ext cx="2474437" cy="3095924"/>
           </a:xfrm>
           <a:prstGeom prst="rect">

</xml_diff>